<commit_message>
Update Student exam scheduler.pptx
</commit_message>
<xml_diff>
--- a/Student exam scheduler.pptx
+++ b/Student exam scheduler.pptx
@@ -9,9 +9,10 @@
     <p:sldId id="257" r:id="rId3"/>
     <p:sldId id="262" r:id="rId4"/>
     <p:sldId id="258" r:id="rId5"/>
-    <p:sldId id="259" r:id="rId6"/>
-    <p:sldId id="260" r:id="rId7"/>
-    <p:sldId id="261" r:id="rId8"/>
+    <p:sldId id="263" r:id="rId6"/>
+    <p:sldId id="259" r:id="rId7"/>
+    <p:sldId id="260" r:id="rId8"/>
+    <p:sldId id="261" r:id="rId9"/>
   </p:sldIdLst>
   <p:sldSz cx="12192000" cy="6858000"/>
   <p:notesSz cx="6858000" cy="9144000"/>
@@ -168,7 +169,7 @@
           <a:noFill/>
           <a:extLst>
             <a:ext uri="{909E8E84-426E-40dd-AFC4-6F175D3DCCD1}">
-              <a14:hiddenFill xmlns="" xmlns:a14="http://schemas.microsoft.com/office/drawing/2010/main">
+              <a14:hiddenFill xmlns:a14="http://schemas.microsoft.com/office/drawing/2010/main" xmlns="">
                 <a:solidFill>
                   <a:srgbClr val="FFFFFF"/>
                 </a:solidFill>
@@ -228,7 +229,7 @@
             </a:ln>
             <a:extLst>
               <a:ext uri="{91240B29-F687-4f45-9708-019B960494DF}">
-                <a14:hiddenLine xmlns="" xmlns:a14="http://schemas.microsoft.com/office/drawing/2010/main" w="9525">
+                <a14:hiddenLine xmlns:a14="http://schemas.microsoft.com/office/drawing/2010/main" xmlns="" w="9525">
                   <a:solidFill>
                     <a:srgbClr val="000000"/>
                   </a:solidFill>
@@ -318,7 +319,7 @@
             </a:ln>
             <a:extLst>
               <a:ext uri="{91240B29-F687-4f45-9708-019B960494DF}">
-                <a14:hiddenLine xmlns="" xmlns:a14="http://schemas.microsoft.com/office/drawing/2010/main" w="9525">
+                <a14:hiddenLine xmlns:a14="http://schemas.microsoft.com/office/drawing/2010/main" xmlns="" w="9525">
                   <a:solidFill>
                     <a:srgbClr val="000000"/>
                   </a:solidFill>
@@ -408,7 +409,7 @@
             </a:ln>
             <a:extLst>
               <a:ext uri="{91240B29-F687-4f45-9708-019B960494DF}">
-                <a14:hiddenLine xmlns="" xmlns:a14="http://schemas.microsoft.com/office/drawing/2010/main" w="9525">
+                <a14:hiddenLine xmlns:a14="http://schemas.microsoft.com/office/drawing/2010/main" xmlns="" w="9525">
                   <a:solidFill>
                     <a:srgbClr val="000000"/>
                   </a:solidFill>
@@ -442,7 +443,7 @@
             </a:ln>
             <a:extLst>
               <a:ext uri="{91240B29-F687-4f45-9708-019B960494DF}">
-                <a14:hiddenLine xmlns="" xmlns:a14="http://schemas.microsoft.com/office/drawing/2010/main" w="9525">
+                <a14:hiddenLine xmlns:a14="http://schemas.microsoft.com/office/drawing/2010/main" xmlns="" w="9525">
                   <a:solidFill>
                     <a:srgbClr val="000000"/>
                   </a:solidFill>
@@ -532,7 +533,7 @@
             </a:ln>
             <a:extLst>
               <a:ext uri="{91240B29-F687-4f45-9708-019B960494DF}">
-                <a14:hiddenLine xmlns="" xmlns:a14="http://schemas.microsoft.com/office/drawing/2010/main" w="9525">
+                <a14:hiddenLine xmlns:a14="http://schemas.microsoft.com/office/drawing/2010/main" xmlns="" w="9525">
                   <a:solidFill>
                     <a:srgbClr val="000000"/>
                   </a:solidFill>
@@ -594,7 +595,7 @@
             </a:ln>
             <a:extLst>
               <a:ext uri="{91240B29-F687-4f45-9708-019B960494DF}">
-                <a14:hiddenLine xmlns="" xmlns:a14="http://schemas.microsoft.com/office/drawing/2010/main" w="9525">
+                <a14:hiddenLine xmlns:a14="http://schemas.microsoft.com/office/drawing/2010/main" xmlns="" w="9525">
                   <a:solidFill>
                     <a:srgbClr val="000000"/>
                   </a:solidFill>
@@ -656,7 +657,7 @@
             </a:ln>
             <a:extLst>
               <a:ext uri="{91240B29-F687-4f45-9708-019B960494DF}">
-                <a14:hiddenLine xmlns="" xmlns:a14="http://schemas.microsoft.com/office/drawing/2010/main" w="9525">
+                <a14:hiddenLine xmlns:a14="http://schemas.microsoft.com/office/drawing/2010/main" xmlns="" w="9525">
                   <a:solidFill>
                     <a:srgbClr val="000000"/>
                   </a:solidFill>
@@ -746,7 +747,7 @@
             </a:ln>
             <a:extLst>
               <a:ext uri="{91240B29-F687-4f45-9708-019B960494DF}">
-                <a14:hiddenLine xmlns="" xmlns:a14="http://schemas.microsoft.com/office/drawing/2010/main" w="9525">
+                <a14:hiddenLine xmlns:a14="http://schemas.microsoft.com/office/drawing/2010/main" xmlns="" w="9525">
                   <a:solidFill>
                     <a:srgbClr val="000000"/>
                   </a:solidFill>
@@ -808,7 +809,7 @@
             </a:ln>
             <a:extLst>
               <a:ext uri="{91240B29-F687-4f45-9708-019B960494DF}">
-                <a14:hiddenLine xmlns="" xmlns:a14="http://schemas.microsoft.com/office/drawing/2010/main" w="9525">
+                <a14:hiddenLine xmlns:a14="http://schemas.microsoft.com/office/drawing/2010/main" xmlns="" w="9525">
                   <a:solidFill>
                     <a:srgbClr val="000000"/>
                   </a:solidFill>
@@ -870,7 +871,7 @@
             </a:ln>
             <a:extLst>
               <a:ext uri="{91240B29-F687-4f45-9708-019B960494DF}">
-                <a14:hiddenLine xmlns="" xmlns:a14="http://schemas.microsoft.com/office/drawing/2010/main" w="9525">
+                <a14:hiddenLine xmlns:a14="http://schemas.microsoft.com/office/drawing/2010/main" xmlns="" w="9525">
                   <a:solidFill>
                     <a:srgbClr val="000000"/>
                   </a:solidFill>
@@ -960,7 +961,7 @@
             </a:ln>
             <a:extLst>
               <a:ext uri="{91240B29-F687-4f45-9708-019B960494DF}">
-                <a14:hiddenLine xmlns="" xmlns:a14="http://schemas.microsoft.com/office/drawing/2010/main" w="9525">
+                <a14:hiddenLine xmlns:a14="http://schemas.microsoft.com/office/drawing/2010/main" xmlns="" w="9525">
                   <a:solidFill>
                     <a:srgbClr val="000000"/>
                   </a:solidFill>
@@ -1050,7 +1051,7 @@
             </a:ln>
             <a:extLst>
               <a:ext uri="{91240B29-F687-4f45-9708-019B960494DF}">
-                <a14:hiddenLine xmlns="" xmlns:a14="http://schemas.microsoft.com/office/drawing/2010/main" w="9525">
+                <a14:hiddenLine xmlns:a14="http://schemas.microsoft.com/office/drawing/2010/main" xmlns="" w="9525">
                   <a:solidFill>
                     <a:srgbClr val="000000"/>
                   </a:solidFill>
@@ -1112,7 +1113,7 @@
             </a:ln>
             <a:extLst>
               <a:ext uri="{91240B29-F687-4f45-9708-019B960494DF}">
-                <a14:hiddenLine xmlns="" xmlns:a14="http://schemas.microsoft.com/office/drawing/2010/main" w="9525">
+                <a14:hiddenLine xmlns:a14="http://schemas.microsoft.com/office/drawing/2010/main" xmlns="" w="9525">
                   <a:solidFill>
                     <a:srgbClr val="000000"/>
                   </a:solidFill>
@@ -1222,7 +1223,7 @@
             </a:ln>
             <a:extLst>
               <a:ext uri="{91240B29-F687-4f45-9708-019B960494DF}">
-                <a14:hiddenLine xmlns="" xmlns:a14="http://schemas.microsoft.com/office/drawing/2010/main" w="9525">
+                <a14:hiddenLine xmlns:a14="http://schemas.microsoft.com/office/drawing/2010/main" xmlns="" w="9525">
                   <a:solidFill>
                     <a:srgbClr val="000000"/>
                   </a:solidFill>
@@ -1284,7 +1285,7 @@
             </a:ln>
             <a:extLst>
               <a:ext uri="{91240B29-F687-4f45-9708-019B960494DF}">
-                <a14:hiddenLine xmlns="" xmlns:a14="http://schemas.microsoft.com/office/drawing/2010/main" w="9525">
+                <a14:hiddenLine xmlns:a14="http://schemas.microsoft.com/office/drawing/2010/main" xmlns="" w="9525">
                   <a:solidFill>
                     <a:srgbClr val="000000"/>
                   </a:solidFill>
@@ -1374,7 +1375,7 @@
             </a:ln>
             <a:extLst>
               <a:ext uri="{91240B29-F687-4f45-9708-019B960494DF}">
-                <a14:hiddenLine xmlns="" xmlns:a14="http://schemas.microsoft.com/office/drawing/2010/main" w="9525">
+                <a14:hiddenLine xmlns:a14="http://schemas.microsoft.com/office/drawing/2010/main" xmlns="" w="9525">
                   <a:solidFill>
                     <a:srgbClr val="000000"/>
                   </a:solidFill>
@@ -1464,7 +1465,7 @@
             </a:ln>
             <a:extLst>
               <a:ext uri="{91240B29-F687-4f45-9708-019B960494DF}">
-                <a14:hiddenLine xmlns="" xmlns:a14="http://schemas.microsoft.com/office/drawing/2010/main" w="9525">
+                <a14:hiddenLine xmlns:a14="http://schemas.microsoft.com/office/drawing/2010/main" xmlns="" w="9525">
                   <a:solidFill>
                     <a:srgbClr val="000000"/>
                   </a:solidFill>
@@ -1526,7 +1527,7 @@
             </a:ln>
             <a:extLst>
               <a:ext uri="{91240B29-F687-4f45-9708-019B960494DF}">
-                <a14:hiddenLine xmlns="" xmlns:a14="http://schemas.microsoft.com/office/drawing/2010/main" w="9525">
+                <a14:hiddenLine xmlns:a14="http://schemas.microsoft.com/office/drawing/2010/main" xmlns="" w="9525">
                   <a:solidFill>
                     <a:srgbClr val="000000"/>
                   </a:solidFill>
@@ -1616,7 +1617,7 @@
             </a:ln>
             <a:extLst>
               <a:ext uri="{91240B29-F687-4f45-9708-019B960494DF}">
-                <a14:hiddenLine xmlns="" xmlns:a14="http://schemas.microsoft.com/office/drawing/2010/main" w="9525">
+                <a14:hiddenLine xmlns:a14="http://schemas.microsoft.com/office/drawing/2010/main" xmlns="" w="9525">
                   <a:solidFill>
                     <a:srgbClr val="000000"/>
                   </a:solidFill>
@@ -1706,7 +1707,7 @@
             </a:ln>
             <a:extLst>
               <a:ext uri="{91240B29-F687-4f45-9708-019B960494DF}">
-                <a14:hiddenLine xmlns="" xmlns:a14="http://schemas.microsoft.com/office/drawing/2010/main" w="9525">
+                <a14:hiddenLine xmlns:a14="http://schemas.microsoft.com/office/drawing/2010/main" xmlns="" w="9525">
                   <a:solidFill>
                     <a:srgbClr val="000000"/>
                   </a:solidFill>
@@ -1762,7 +1763,7 @@
             </a:ln>
             <a:extLst>
               <a:ext uri="{91240B29-F687-4f45-9708-019B960494DF}">
-                <a14:hiddenLine xmlns="" xmlns:a14="http://schemas.microsoft.com/office/drawing/2010/main" w="9525">
+                <a14:hiddenLine xmlns:a14="http://schemas.microsoft.com/office/drawing/2010/main" xmlns="" w="9525">
                   <a:solidFill>
                     <a:srgbClr val="000000"/>
                   </a:solidFill>
@@ -1852,7 +1853,7 @@
             </a:ln>
             <a:extLst>
               <a:ext uri="{91240B29-F687-4f45-9708-019B960494DF}">
-                <a14:hiddenLine xmlns="" xmlns:a14="http://schemas.microsoft.com/office/drawing/2010/main" w="9525">
+                <a14:hiddenLine xmlns:a14="http://schemas.microsoft.com/office/drawing/2010/main" xmlns="" w="9525">
                   <a:solidFill>
                     <a:srgbClr val="000000"/>
                   </a:solidFill>
@@ -1908,7 +1909,7 @@
             </a:ln>
             <a:extLst>
               <a:ext uri="{91240B29-F687-4f45-9708-019B960494DF}">
-                <a14:hiddenLine xmlns="" xmlns:a14="http://schemas.microsoft.com/office/drawing/2010/main" w="9525">
+                <a14:hiddenLine xmlns:a14="http://schemas.microsoft.com/office/drawing/2010/main" xmlns="" w="9525">
                   <a:solidFill>
                     <a:srgbClr val="000000"/>
                   </a:solidFill>
@@ -1998,7 +1999,7 @@
             </a:ln>
             <a:extLst>
               <a:ext uri="{91240B29-F687-4f45-9708-019B960494DF}">
-                <a14:hiddenLine xmlns="" xmlns:a14="http://schemas.microsoft.com/office/drawing/2010/main" w="9525">
+                <a14:hiddenLine xmlns:a14="http://schemas.microsoft.com/office/drawing/2010/main" xmlns="" w="9525">
                   <a:solidFill>
                     <a:srgbClr val="000000"/>
                   </a:solidFill>
@@ -2066,7 +2067,7 @@
             </a:ln>
             <a:extLst>
               <a:ext uri="{91240B29-F687-4f45-9708-019B960494DF}">
-                <a14:hiddenLine xmlns="" xmlns:a14="http://schemas.microsoft.com/office/drawing/2010/main" w="9525">
+                <a14:hiddenLine xmlns:a14="http://schemas.microsoft.com/office/drawing/2010/main" xmlns="" w="9525">
                   <a:solidFill>
                     <a:srgbClr val="000000"/>
                   </a:solidFill>
@@ -2156,7 +2157,7 @@
             </a:ln>
             <a:extLst>
               <a:ext uri="{91240B29-F687-4f45-9708-019B960494DF}">
-                <a14:hiddenLine xmlns="" xmlns:a14="http://schemas.microsoft.com/office/drawing/2010/main" w="9525">
+                <a14:hiddenLine xmlns:a14="http://schemas.microsoft.com/office/drawing/2010/main" xmlns="" w="9525">
                   <a:solidFill>
                     <a:srgbClr val="000000"/>
                   </a:solidFill>
@@ -2224,7 +2225,7 @@
             </a:ln>
             <a:extLst>
               <a:ext uri="{91240B29-F687-4f45-9708-019B960494DF}">
-                <a14:hiddenLine xmlns="" xmlns:a14="http://schemas.microsoft.com/office/drawing/2010/main" w="9525">
+                <a14:hiddenLine xmlns:a14="http://schemas.microsoft.com/office/drawing/2010/main" xmlns="" w="9525">
                   <a:solidFill>
                     <a:srgbClr val="000000"/>
                   </a:solidFill>
@@ -2314,7 +2315,7 @@
             </a:ln>
             <a:extLst>
               <a:ext uri="{91240B29-F687-4f45-9708-019B960494DF}">
-                <a14:hiddenLine xmlns="" xmlns:a14="http://schemas.microsoft.com/office/drawing/2010/main" w="9525">
+                <a14:hiddenLine xmlns:a14="http://schemas.microsoft.com/office/drawing/2010/main" xmlns="" w="9525">
                   <a:solidFill>
                     <a:srgbClr val="000000"/>
                   </a:solidFill>
@@ -2348,7 +2349,7 @@
             </a:ln>
             <a:extLst>
               <a:ext uri="{91240B29-F687-4f45-9708-019B960494DF}">
-                <a14:hiddenLine xmlns="" xmlns:a14="http://schemas.microsoft.com/office/drawing/2010/main" w="9525">
+                <a14:hiddenLine xmlns:a14="http://schemas.microsoft.com/office/drawing/2010/main" xmlns="" w="9525">
                   <a:solidFill>
                     <a:srgbClr val="000000"/>
                   </a:solidFill>
@@ -2438,7 +2439,7 @@
             </a:ln>
             <a:extLst>
               <a:ext uri="{91240B29-F687-4f45-9708-019B960494DF}">
-                <a14:hiddenLine xmlns="" xmlns:a14="http://schemas.microsoft.com/office/drawing/2010/main" w="9525">
+                <a14:hiddenLine xmlns:a14="http://schemas.microsoft.com/office/drawing/2010/main" xmlns="" w="9525">
                   <a:solidFill>
                     <a:srgbClr val="000000"/>
                   </a:solidFill>
@@ -2500,7 +2501,7 @@
             </a:ln>
             <a:extLst>
               <a:ext uri="{91240B29-F687-4f45-9708-019B960494DF}">
-                <a14:hiddenLine xmlns="" xmlns:a14="http://schemas.microsoft.com/office/drawing/2010/main" w="9525">
+                <a14:hiddenLine xmlns:a14="http://schemas.microsoft.com/office/drawing/2010/main" xmlns="" w="9525">
                   <a:solidFill>
                     <a:srgbClr val="000000"/>
                   </a:solidFill>
@@ -2562,7 +2563,7 @@
             </a:ln>
             <a:extLst>
               <a:ext uri="{91240B29-F687-4f45-9708-019B960494DF}">
-                <a14:hiddenLine xmlns="" xmlns:a14="http://schemas.microsoft.com/office/drawing/2010/main" w="9525">
+                <a14:hiddenLine xmlns:a14="http://schemas.microsoft.com/office/drawing/2010/main" xmlns="" w="9525">
                   <a:solidFill>
                     <a:srgbClr val="000000"/>
                   </a:solidFill>
@@ -2652,7 +2653,7 @@
             </a:ln>
             <a:extLst>
               <a:ext uri="{91240B29-F687-4f45-9708-019B960494DF}">
-                <a14:hiddenLine xmlns="" xmlns:a14="http://schemas.microsoft.com/office/drawing/2010/main" w="9525">
+                <a14:hiddenLine xmlns:a14="http://schemas.microsoft.com/office/drawing/2010/main" xmlns="" w="9525">
                   <a:solidFill>
                     <a:srgbClr val="000000"/>
                   </a:solidFill>
@@ -2720,7 +2721,7 @@
             </a:ln>
             <a:extLst>
               <a:ext uri="{91240B29-F687-4f45-9708-019B960494DF}">
-                <a14:hiddenLine xmlns="" xmlns:a14="http://schemas.microsoft.com/office/drawing/2010/main" w="9525">
+                <a14:hiddenLine xmlns:a14="http://schemas.microsoft.com/office/drawing/2010/main" xmlns="" w="9525">
                   <a:solidFill>
                     <a:srgbClr val="000000"/>
                   </a:solidFill>
@@ -2782,7 +2783,7 @@
             </a:ln>
             <a:extLst>
               <a:ext uri="{91240B29-F687-4f45-9708-019B960494DF}">
-                <a14:hiddenLine xmlns="" xmlns:a14="http://schemas.microsoft.com/office/drawing/2010/main" w="9525">
+                <a14:hiddenLine xmlns:a14="http://schemas.microsoft.com/office/drawing/2010/main" xmlns="" w="9525">
                   <a:solidFill>
                     <a:srgbClr val="000000"/>
                   </a:solidFill>
@@ -2872,7 +2873,7 @@
             </a:ln>
             <a:extLst>
               <a:ext uri="{91240B29-F687-4f45-9708-019B960494DF}">
-                <a14:hiddenLine xmlns="" xmlns:a14="http://schemas.microsoft.com/office/drawing/2010/main" w="9525">
+                <a14:hiddenLine xmlns:a14="http://schemas.microsoft.com/office/drawing/2010/main" xmlns="" w="9525">
                   <a:solidFill>
                     <a:srgbClr val="000000"/>
                   </a:solidFill>
@@ -2934,7 +2935,7 @@
             </a:ln>
             <a:extLst>
               <a:ext uri="{91240B29-F687-4f45-9708-019B960494DF}">
-                <a14:hiddenLine xmlns="" xmlns:a14="http://schemas.microsoft.com/office/drawing/2010/main" w="9525">
+                <a14:hiddenLine xmlns:a14="http://schemas.microsoft.com/office/drawing/2010/main" xmlns="" w="9525">
                   <a:solidFill>
                     <a:srgbClr val="000000"/>
                   </a:solidFill>
@@ -3024,7 +3025,7 @@
             </a:ln>
             <a:extLst>
               <a:ext uri="{91240B29-F687-4f45-9708-019B960494DF}">
-                <a14:hiddenLine xmlns="" xmlns:a14="http://schemas.microsoft.com/office/drawing/2010/main" w="9525">
+                <a14:hiddenLine xmlns:a14="http://schemas.microsoft.com/office/drawing/2010/main" xmlns="" w="9525">
                   <a:solidFill>
                     <a:srgbClr val="000000"/>
                   </a:solidFill>
@@ -3086,7 +3087,7 @@
             </a:ln>
             <a:extLst>
               <a:ext uri="{91240B29-F687-4f45-9708-019B960494DF}">
-                <a14:hiddenLine xmlns="" xmlns:a14="http://schemas.microsoft.com/office/drawing/2010/main" w="9525">
+                <a14:hiddenLine xmlns:a14="http://schemas.microsoft.com/office/drawing/2010/main" xmlns="" w="9525">
                   <a:solidFill>
                     <a:srgbClr val="000000"/>
                   </a:solidFill>
@@ -3176,7 +3177,7 @@
             </a:ln>
             <a:extLst>
               <a:ext uri="{91240B29-F687-4f45-9708-019B960494DF}">
-                <a14:hiddenLine xmlns="" xmlns:a14="http://schemas.microsoft.com/office/drawing/2010/main" w="9525">
+                <a14:hiddenLine xmlns:a14="http://schemas.microsoft.com/office/drawing/2010/main" xmlns="" w="9525">
                   <a:solidFill>
                     <a:srgbClr val="000000"/>
                   </a:solidFill>
@@ -3210,7 +3211,7 @@
             </a:ln>
             <a:extLst>
               <a:ext uri="{91240B29-F687-4f45-9708-019B960494DF}">
-                <a14:hiddenLine xmlns="" xmlns:a14="http://schemas.microsoft.com/office/drawing/2010/main" w="9525">
+                <a14:hiddenLine xmlns:a14="http://schemas.microsoft.com/office/drawing/2010/main" xmlns="" w="9525">
                   <a:solidFill>
                     <a:srgbClr val="000000"/>
                   </a:solidFill>
@@ -3275,7 +3276,7 @@
             </a:ln>
             <a:extLst>
               <a:ext uri="{91240B29-F687-4f45-9708-019B960494DF}">
-                <a14:hiddenLine xmlns="" xmlns:a14="http://schemas.microsoft.com/office/drawing/2010/main" w="9525">
+                <a14:hiddenLine xmlns:a14="http://schemas.microsoft.com/office/drawing/2010/main" xmlns="" w="9525">
                   <a:solidFill>
                     <a:srgbClr val="000000"/>
                   </a:solidFill>
@@ -3365,7 +3366,7 @@
             </a:ln>
             <a:extLst>
               <a:ext uri="{91240B29-F687-4f45-9708-019B960494DF}">
-                <a14:hiddenLine xmlns="" xmlns:a14="http://schemas.microsoft.com/office/drawing/2010/main" w="9525">
+                <a14:hiddenLine xmlns:a14="http://schemas.microsoft.com/office/drawing/2010/main" xmlns="" w="9525">
                   <a:solidFill>
                     <a:srgbClr val="000000"/>
                   </a:solidFill>
@@ -3427,7 +3428,7 @@
             </a:ln>
             <a:extLst>
               <a:ext uri="{91240B29-F687-4f45-9708-019B960494DF}">
-                <a14:hiddenLine xmlns="" xmlns:a14="http://schemas.microsoft.com/office/drawing/2010/main" w="9525">
+                <a14:hiddenLine xmlns:a14="http://schemas.microsoft.com/office/drawing/2010/main" xmlns="" w="9525">
                   <a:solidFill>
                     <a:srgbClr val="000000"/>
                   </a:solidFill>
@@ -3517,7 +3518,7 @@
             </a:ln>
             <a:extLst>
               <a:ext uri="{91240B29-F687-4f45-9708-019B960494DF}">
-                <a14:hiddenLine xmlns="" xmlns:a14="http://schemas.microsoft.com/office/drawing/2010/main" w="9525">
+                <a14:hiddenLine xmlns:a14="http://schemas.microsoft.com/office/drawing/2010/main" xmlns="" w="9525">
                   <a:solidFill>
                     <a:srgbClr val="000000"/>
                   </a:solidFill>
@@ -3607,7 +3608,7 @@
             </a:ln>
             <a:extLst>
               <a:ext uri="{91240B29-F687-4f45-9708-019B960494DF}">
-                <a14:hiddenLine xmlns="" xmlns:a14="http://schemas.microsoft.com/office/drawing/2010/main" w="9525">
+                <a14:hiddenLine xmlns:a14="http://schemas.microsoft.com/office/drawing/2010/main" xmlns="" w="9525">
                   <a:solidFill>
                     <a:srgbClr val="000000"/>
                   </a:solidFill>
@@ -3672,7 +3673,7 @@
             </a:ln>
             <a:extLst>
               <a:ext uri="{91240B29-F687-4f45-9708-019B960494DF}">
-                <a14:hiddenLine xmlns="" xmlns:a14="http://schemas.microsoft.com/office/drawing/2010/main" w="9525">
+                <a14:hiddenLine xmlns:a14="http://schemas.microsoft.com/office/drawing/2010/main" xmlns="" w="9525">
                   <a:solidFill>
                     <a:srgbClr val="000000"/>
                   </a:solidFill>
@@ -3734,7 +3735,7 @@
             </a:ln>
             <a:extLst>
               <a:ext uri="{91240B29-F687-4f45-9708-019B960494DF}">
-                <a14:hiddenLine xmlns="" xmlns:a14="http://schemas.microsoft.com/office/drawing/2010/main" w="9525">
+                <a14:hiddenLine xmlns:a14="http://schemas.microsoft.com/office/drawing/2010/main" xmlns="" w="9525">
                   <a:solidFill>
                     <a:srgbClr val="000000"/>
                   </a:solidFill>
@@ -3824,7 +3825,7 @@
             </a:ln>
             <a:extLst>
               <a:ext uri="{91240B29-F687-4f45-9708-019B960494DF}">
-                <a14:hiddenLine xmlns="" xmlns:a14="http://schemas.microsoft.com/office/drawing/2010/main" w="9525">
+                <a14:hiddenLine xmlns:a14="http://schemas.microsoft.com/office/drawing/2010/main" xmlns="" w="9525">
                   <a:solidFill>
                     <a:srgbClr val="000000"/>
                   </a:solidFill>
@@ -3914,7 +3915,7 @@
             </a:ln>
             <a:extLst>
               <a:ext uri="{91240B29-F687-4f45-9708-019B960494DF}">
-                <a14:hiddenLine xmlns="" xmlns:a14="http://schemas.microsoft.com/office/drawing/2010/main" w="9525">
+                <a14:hiddenLine xmlns:a14="http://schemas.microsoft.com/office/drawing/2010/main" xmlns="" w="9525">
                   <a:solidFill>
                     <a:srgbClr val="000000"/>
                   </a:solidFill>
@@ -3976,7 +3977,7 @@
             </a:ln>
             <a:extLst>
               <a:ext uri="{91240B29-F687-4f45-9708-019B960494DF}">
-                <a14:hiddenLine xmlns="" xmlns:a14="http://schemas.microsoft.com/office/drawing/2010/main" w="9525">
+                <a14:hiddenLine xmlns:a14="http://schemas.microsoft.com/office/drawing/2010/main" xmlns="" w="9525">
                   <a:solidFill>
                     <a:srgbClr val="000000"/>
                   </a:solidFill>
@@ -4096,7 +4097,7 @@
             </a:ln>
             <a:extLst>
               <a:ext uri="{91240B29-F687-4f45-9708-019B960494DF}">
-                <a14:hiddenLine xmlns="" xmlns:a14="http://schemas.microsoft.com/office/drawing/2010/main" w="9525">
+                <a14:hiddenLine xmlns:a14="http://schemas.microsoft.com/office/drawing/2010/main" xmlns="" w="9525">
                   <a:solidFill>
                     <a:srgbClr val="000000"/>
                   </a:solidFill>
@@ -4164,7 +4165,7 @@
             </a:ln>
             <a:extLst>
               <a:ext uri="{91240B29-F687-4f45-9708-019B960494DF}">
-                <a14:hiddenLine xmlns="" xmlns:a14="http://schemas.microsoft.com/office/drawing/2010/main" w="9525">
+                <a14:hiddenLine xmlns:a14="http://schemas.microsoft.com/office/drawing/2010/main" xmlns="" w="9525">
                   <a:solidFill>
                     <a:srgbClr val="000000"/>
                   </a:solidFill>
@@ -4254,7 +4255,7 @@
             </a:ln>
             <a:extLst>
               <a:ext uri="{91240B29-F687-4f45-9708-019B960494DF}">
-                <a14:hiddenLine xmlns="" xmlns:a14="http://schemas.microsoft.com/office/drawing/2010/main" w="9525">
+                <a14:hiddenLine xmlns:a14="http://schemas.microsoft.com/office/drawing/2010/main" xmlns="" w="9525">
                   <a:solidFill>
                     <a:srgbClr val="000000"/>
                   </a:solidFill>
@@ -8976,7 +8977,7 @@
           <a:noFill/>
           <a:extLst>
             <a:ext uri="{909E8E84-426E-40dd-AFC4-6F175D3DCCD1}">
-              <a14:hiddenFill xmlns="" xmlns:a14="http://schemas.microsoft.com/office/drawing/2010/main">
+              <a14:hiddenFill xmlns:a14="http://schemas.microsoft.com/office/drawing/2010/main" xmlns="">
                 <a:solidFill>
                   <a:srgbClr val="FFFFFF"/>
                 </a:solidFill>
@@ -9050,7 +9051,7 @@
               </a:ln>
               <a:extLst>
                 <a:ext uri="{91240B29-F687-4f45-9708-019B960494DF}">
-                  <a14:hiddenLine xmlns="" xmlns:a14="http://schemas.microsoft.com/office/drawing/2010/main" w="9525">
+                  <a14:hiddenLine xmlns:a14="http://schemas.microsoft.com/office/drawing/2010/main" xmlns="" w="9525">
                     <a:solidFill>
                       <a:srgbClr val="000000"/>
                     </a:solidFill>
@@ -9140,7 +9141,7 @@
               </a:ln>
               <a:extLst>
                 <a:ext uri="{91240B29-F687-4f45-9708-019B960494DF}">
-                  <a14:hiddenLine xmlns="" xmlns:a14="http://schemas.microsoft.com/office/drawing/2010/main" w="9525">
+                  <a14:hiddenLine xmlns:a14="http://schemas.microsoft.com/office/drawing/2010/main" xmlns="" w="9525">
                     <a:solidFill>
                       <a:srgbClr val="000000"/>
                     </a:solidFill>
@@ -9230,7 +9231,7 @@
               </a:ln>
               <a:extLst>
                 <a:ext uri="{91240B29-F687-4f45-9708-019B960494DF}">
-                  <a14:hiddenLine xmlns="" xmlns:a14="http://schemas.microsoft.com/office/drawing/2010/main" w="9525">
+                  <a14:hiddenLine xmlns:a14="http://schemas.microsoft.com/office/drawing/2010/main" xmlns="" w="9525">
                     <a:solidFill>
                       <a:srgbClr val="000000"/>
                     </a:solidFill>
@@ -9292,7 +9293,7 @@
               </a:ln>
               <a:extLst>
                 <a:ext uri="{91240B29-F687-4f45-9708-019B960494DF}">
-                  <a14:hiddenLine xmlns="" xmlns:a14="http://schemas.microsoft.com/office/drawing/2010/main" w="9525">
+                  <a14:hiddenLine xmlns:a14="http://schemas.microsoft.com/office/drawing/2010/main" xmlns="" w="9525">
                     <a:solidFill>
                       <a:srgbClr val="000000"/>
                     </a:solidFill>
@@ -9382,7 +9383,7 @@
               </a:ln>
               <a:extLst>
                 <a:ext uri="{91240B29-F687-4f45-9708-019B960494DF}">
-                  <a14:hiddenLine xmlns="" xmlns:a14="http://schemas.microsoft.com/office/drawing/2010/main" w="9525">
+                  <a14:hiddenLine xmlns:a14="http://schemas.microsoft.com/office/drawing/2010/main" xmlns="" w="9525">
                     <a:solidFill>
                       <a:srgbClr val="000000"/>
                     </a:solidFill>
@@ -9444,7 +9445,7 @@
               </a:ln>
               <a:extLst>
                 <a:ext uri="{91240B29-F687-4f45-9708-019B960494DF}">
-                  <a14:hiddenLine xmlns="" xmlns:a14="http://schemas.microsoft.com/office/drawing/2010/main" w="9525">
+                  <a14:hiddenLine xmlns:a14="http://schemas.microsoft.com/office/drawing/2010/main" xmlns="" w="9525">
                     <a:solidFill>
                       <a:srgbClr val="000000"/>
                     </a:solidFill>
@@ -9506,7 +9507,7 @@
               </a:ln>
               <a:extLst>
                 <a:ext uri="{91240B29-F687-4f45-9708-019B960494DF}">
-                  <a14:hiddenLine xmlns="" xmlns:a14="http://schemas.microsoft.com/office/drawing/2010/main" w="9525">
+                  <a14:hiddenLine xmlns:a14="http://schemas.microsoft.com/office/drawing/2010/main" xmlns="" w="9525">
                     <a:solidFill>
                       <a:srgbClr val="000000"/>
                     </a:solidFill>
@@ -9596,7 +9597,7 @@
               </a:ln>
               <a:extLst>
                 <a:ext uri="{91240B29-F687-4f45-9708-019B960494DF}">
-                  <a14:hiddenLine xmlns="" xmlns:a14="http://schemas.microsoft.com/office/drawing/2010/main" w="9525">
+                  <a14:hiddenLine xmlns:a14="http://schemas.microsoft.com/office/drawing/2010/main" xmlns="" w="9525">
                     <a:solidFill>
                       <a:srgbClr val="000000"/>
                     </a:solidFill>
@@ -9686,7 +9687,7 @@
               </a:ln>
               <a:extLst>
                 <a:ext uri="{91240B29-F687-4f45-9708-019B960494DF}">
-                  <a14:hiddenLine xmlns="" xmlns:a14="http://schemas.microsoft.com/office/drawing/2010/main" w="9525">
+                  <a14:hiddenLine xmlns:a14="http://schemas.microsoft.com/office/drawing/2010/main" xmlns="" w="9525">
                     <a:solidFill>
                       <a:srgbClr val="000000"/>
                     </a:solidFill>
@@ -9748,7 +9749,7 @@
               </a:ln>
               <a:extLst>
                 <a:ext uri="{91240B29-F687-4f45-9708-019B960494DF}">
-                  <a14:hiddenLine xmlns="" xmlns:a14="http://schemas.microsoft.com/office/drawing/2010/main" w="9525">
+                  <a14:hiddenLine xmlns:a14="http://schemas.microsoft.com/office/drawing/2010/main" xmlns="" w="9525">
                     <a:solidFill>
                       <a:srgbClr val="000000"/>
                     </a:solidFill>
@@ -9858,7 +9859,7 @@
               </a:ln>
               <a:extLst>
                 <a:ext uri="{91240B29-F687-4f45-9708-019B960494DF}">
-                  <a14:hiddenLine xmlns="" xmlns:a14="http://schemas.microsoft.com/office/drawing/2010/main" w="9525">
+                  <a14:hiddenLine xmlns:a14="http://schemas.microsoft.com/office/drawing/2010/main" xmlns="" w="9525">
                     <a:solidFill>
                       <a:srgbClr val="000000"/>
                     </a:solidFill>
@@ -9942,7 +9943,7 @@
               </a:ln>
               <a:extLst>
                 <a:ext uri="{91240B29-F687-4f45-9708-019B960494DF}">
-                  <a14:hiddenLine xmlns="" xmlns:a14="http://schemas.microsoft.com/office/drawing/2010/main" w="9525">
+                  <a14:hiddenLine xmlns:a14="http://schemas.microsoft.com/office/drawing/2010/main" xmlns="" w="9525">
                     <a:solidFill>
                       <a:srgbClr val="000000"/>
                     </a:solidFill>
@@ -10004,7 +10005,7 @@
               </a:ln>
               <a:extLst>
                 <a:ext uri="{91240B29-F687-4f45-9708-019B960494DF}">
-                  <a14:hiddenLine xmlns="" xmlns:a14="http://schemas.microsoft.com/office/drawing/2010/main" w="9525">
+                  <a14:hiddenLine xmlns:a14="http://schemas.microsoft.com/office/drawing/2010/main" xmlns="" w="9525">
                     <a:solidFill>
                       <a:srgbClr val="000000"/>
                     </a:solidFill>
@@ -10066,7 +10067,7 @@
               </a:ln>
               <a:extLst>
                 <a:ext uri="{91240B29-F687-4f45-9708-019B960494DF}">
-                  <a14:hiddenLine xmlns="" xmlns:a14="http://schemas.microsoft.com/office/drawing/2010/main" w="9525">
+                  <a14:hiddenLine xmlns:a14="http://schemas.microsoft.com/office/drawing/2010/main" xmlns="" w="9525">
                     <a:solidFill>
                       <a:srgbClr val="000000"/>
                     </a:solidFill>
@@ -10156,7 +10157,7 @@
               </a:ln>
               <a:extLst>
                 <a:ext uri="{91240B29-F687-4f45-9708-019B960494DF}">
-                  <a14:hiddenLine xmlns="" xmlns:a14="http://schemas.microsoft.com/office/drawing/2010/main" w="9525">
+                  <a14:hiddenLine xmlns:a14="http://schemas.microsoft.com/office/drawing/2010/main" xmlns="" w="9525">
                     <a:solidFill>
                       <a:srgbClr val="000000"/>
                     </a:solidFill>
@@ -10190,7 +10191,7 @@
               </a:ln>
               <a:extLst>
                 <a:ext uri="{91240B29-F687-4f45-9708-019B960494DF}">
-                  <a14:hiddenLine xmlns="" xmlns:a14="http://schemas.microsoft.com/office/drawing/2010/main" w="9525">
+                  <a14:hiddenLine xmlns:a14="http://schemas.microsoft.com/office/drawing/2010/main" xmlns="" w="9525">
                     <a:solidFill>
                       <a:srgbClr val="000000"/>
                     </a:solidFill>
@@ -10255,7 +10256,7 @@
               </a:ln>
               <a:extLst>
                 <a:ext uri="{91240B29-F687-4f45-9708-019B960494DF}">
-                  <a14:hiddenLine xmlns="" xmlns:a14="http://schemas.microsoft.com/office/drawing/2010/main" w="9525">
+                  <a14:hiddenLine xmlns:a14="http://schemas.microsoft.com/office/drawing/2010/main" xmlns="" w="9525">
                     <a:solidFill>
                       <a:srgbClr val="000000"/>
                     </a:solidFill>
@@ -10345,7 +10346,7 @@
               </a:ln>
               <a:extLst>
                 <a:ext uri="{91240B29-F687-4f45-9708-019B960494DF}">
-                  <a14:hiddenLine xmlns="" xmlns:a14="http://schemas.microsoft.com/office/drawing/2010/main" w="9525">
+                  <a14:hiddenLine xmlns:a14="http://schemas.microsoft.com/office/drawing/2010/main" xmlns="" w="9525">
                     <a:solidFill>
                       <a:srgbClr val="000000"/>
                     </a:solidFill>
@@ -10407,7 +10408,7 @@
               </a:ln>
               <a:extLst>
                 <a:ext uri="{91240B29-F687-4f45-9708-019B960494DF}">
-                  <a14:hiddenLine xmlns="" xmlns:a14="http://schemas.microsoft.com/office/drawing/2010/main" w="9525">
+                  <a14:hiddenLine xmlns:a14="http://schemas.microsoft.com/office/drawing/2010/main" xmlns="" w="9525">
                     <a:solidFill>
                       <a:srgbClr val="000000"/>
                     </a:solidFill>
@@ -10497,7 +10498,7 @@
               </a:ln>
               <a:extLst>
                 <a:ext uri="{91240B29-F687-4f45-9708-019B960494DF}">
-                  <a14:hiddenLine xmlns="" xmlns:a14="http://schemas.microsoft.com/office/drawing/2010/main" w="9525">
+                  <a14:hiddenLine xmlns:a14="http://schemas.microsoft.com/office/drawing/2010/main" xmlns="" w="9525">
                     <a:solidFill>
                       <a:srgbClr val="000000"/>
                     </a:solidFill>
@@ -10562,7 +10563,7 @@
               </a:ln>
               <a:extLst>
                 <a:ext uri="{91240B29-F687-4f45-9708-019B960494DF}">
-                  <a14:hiddenLine xmlns="" xmlns:a14="http://schemas.microsoft.com/office/drawing/2010/main" w="9525">
+                  <a14:hiddenLine xmlns:a14="http://schemas.microsoft.com/office/drawing/2010/main" xmlns="" w="9525">
                     <a:solidFill>
                       <a:srgbClr val="000000"/>
                     </a:solidFill>
@@ -10624,7 +10625,7 @@
               </a:ln>
               <a:extLst>
                 <a:ext uri="{91240B29-F687-4f45-9708-019B960494DF}">
-                  <a14:hiddenLine xmlns="" xmlns:a14="http://schemas.microsoft.com/office/drawing/2010/main" w="9525">
+                  <a14:hiddenLine xmlns:a14="http://schemas.microsoft.com/office/drawing/2010/main" xmlns="" w="9525">
                     <a:solidFill>
                       <a:srgbClr val="000000"/>
                     </a:solidFill>
@@ -10714,7 +10715,7 @@
               </a:ln>
               <a:extLst>
                 <a:ext uri="{91240B29-F687-4f45-9708-019B960494DF}">
-                  <a14:hiddenLine xmlns="" xmlns:a14="http://schemas.microsoft.com/office/drawing/2010/main" w="9525">
+                  <a14:hiddenLine xmlns:a14="http://schemas.microsoft.com/office/drawing/2010/main" xmlns="" w="9525">
                     <a:solidFill>
                       <a:srgbClr val="000000"/>
                     </a:solidFill>
@@ -10804,7 +10805,7 @@
               </a:ln>
               <a:extLst>
                 <a:ext uri="{91240B29-F687-4f45-9708-019B960494DF}">
-                  <a14:hiddenLine xmlns="" xmlns:a14="http://schemas.microsoft.com/office/drawing/2010/main" w="9525">
+                  <a14:hiddenLine xmlns:a14="http://schemas.microsoft.com/office/drawing/2010/main" xmlns="" w="9525">
                     <a:solidFill>
                       <a:srgbClr val="000000"/>
                     </a:solidFill>
@@ -10869,7 +10870,7 @@
               </a:ln>
               <a:extLst>
                 <a:ext uri="{91240B29-F687-4f45-9708-019B960494DF}">
-                  <a14:hiddenLine xmlns="" xmlns:a14="http://schemas.microsoft.com/office/drawing/2010/main" w="9525">
+                  <a14:hiddenLine xmlns:a14="http://schemas.microsoft.com/office/drawing/2010/main" xmlns="" w="9525">
                     <a:solidFill>
                       <a:srgbClr val="000000"/>
                     </a:solidFill>
@@ -10989,7 +10990,7 @@
               </a:ln>
               <a:extLst>
                 <a:ext uri="{91240B29-F687-4f45-9708-019B960494DF}">
-                  <a14:hiddenLine xmlns="" xmlns:a14="http://schemas.microsoft.com/office/drawing/2010/main" w="9525">
+                  <a14:hiddenLine xmlns:a14="http://schemas.microsoft.com/office/drawing/2010/main" xmlns="" w="9525">
                     <a:solidFill>
                       <a:srgbClr val="000000"/>
                     </a:solidFill>
@@ -11087,7 +11088,7 @@
               </a:ln>
               <a:extLst>
                 <a:ext uri="{91240B29-F687-4f45-9708-019B960494DF}">
-                  <a14:hiddenLine xmlns="" xmlns:a14="http://schemas.microsoft.com/office/drawing/2010/main" w="9525">
+                  <a14:hiddenLine xmlns:a14="http://schemas.microsoft.com/office/drawing/2010/main" xmlns="" w="9525">
                     <a:solidFill>
                       <a:srgbClr val="000000"/>
                     </a:solidFill>
@@ -11202,7 +11203,7 @@
               </a:ln>
               <a:extLst>
                 <a:ext uri="{91240B29-F687-4f45-9708-019B960494DF}">
-                  <a14:hiddenLine xmlns="" xmlns:a14="http://schemas.microsoft.com/office/drawing/2010/main" w="9525">
+                  <a14:hiddenLine xmlns:a14="http://schemas.microsoft.com/office/drawing/2010/main" xmlns="" w="9525">
                     <a:solidFill>
                       <a:srgbClr val="000000"/>
                     </a:solidFill>
@@ -11292,7 +11293,7 @@
               </a:ln>
               <a:extLst>
                 <a:ext uri="{91240B29-F687-4f45-9708-019B960494DF}">
-                  <a14:hiddenLine xmlns="" xmlns:a14="http://schemas.microsoft.com/office/drawing/2010/main" w="9525">
+                  <a14:hiddenLine xmlns:a14="http://schemas.microsoft.com/office/drawing/2010/main" xmlns="" w="9525">
                     <a:solidFill>
                       <a:srgbClr val="000000"/>
                     </a:solidFill>
@@ -11357,7 +11358,7 @@
               </a:ln>
               <a:extLst>
                 <a:ext uri="{91240B29-F687-4f45-9708-019B960494DF}">
-                  <a14:hiddenLine xmlns="" xmlns:a14="http://schemas.microsoft.com/office/drawing/2010/main" w="9525">
+                  <a14:hiddenLine xmlns:a14="http://schemas.microsoft.com/office/drawing/2010/main" xmlns="" w="9525">
                     <a:solidFill>
                       <a:srgbClr val="000000"/>
                     </a:solidFill>
@@ -11447,7 +11448,7 @@
               </a:ln>
               <a:extLst>
                 <a:ext uri="{91240B29-F687-4f45-9708-019B960494DF}">
-                  <a14:hiddenLine xmlns="" xmlns:a14="http://schemas.microsoft.com/office/drawing/2010/main" w="9525">
+                  <a14:hiddenLine xmlns:a14="http://schemas.microsoft.com/office/drawing/2010/main" xmlns="" w="9525">
                     <a:solidFill>
                       <a:srgbClr val="000000"/>
                     </a:solidFill>
@@ -11515,7 +11516,7 @@
               </a:ln>
               <a:extLst>
                 <a:ext uri="{91240B29-F687-4f45-9708-019B960494DF}">
-                  <a14:hiddenLine xmlns="" xmlns:a14="http://schemas.microsoft.com/office/drawing/2010/main" w="9525">
+                  <a14:hiddenLine xmlns:a14="http://schemas.microsoft.com/office/drawing/2010/main" xmlns="" w="9525">
                     <a:solidFill>
                       <a:srgbClr val="000000"/>
                     </a:solidFill>
@@ -11605,7 +11606,7 @@
               </a:ln>
               <a:extLst>
                 <a:ext uri="{91240B29-F687-4f45-9708-019B960494DF}">
-                  <a14:hiddenLine xmlns="" xmlns:a14="http://schemas.microsoft.com/office/drawing/2010/main" w="9525">
+                  <a14:hiddenLine xmlns:a14="http://schemas.microsoft.com/office/drawing/2010/main" xmlns="" w="9525">
                     <a:solidFill>
                       <a:srgbClr val="000000"/>
                     </a:solidFill>
@@ -11673,7 +11674,7 @@
               </a:ln>
               <a:extLst>
                 <a:ext uri="{91240B29-F687-4f45-9708-019B960494DF}">
-                  <a14:hiddenLine xmlns="" xmlns:a14="http://schemas.microsoft.com/office/drawing/2010/main" w="9525">
+                  <a14:hiddenLine xmlns:a14="http://schemas.microsoft.com/office/drawing/2010/main" xmlns="" w="9525">
                     <a:solidFill>
                       <a:srgbClr val="000000"/>
                     </a:solidFill>
@@ -11763,7 +11764,7 @@
               </a:ln>
               <a:extLst>
                 <a:ext uri="{91240B29-F687-4f45-9708-019B960494DF}">
-                  <a14:hiddenLine xmlns="" xmlns:a14="http://schemas.microsoft.com/office/drawing/2010/main" w="9525">
+                  <a14:hiddenLine xmlns:a14="http://schemas.microsoft.com/office/drawing/2010/main" xmlns="" w="9525">
                     <a:solidFill>
                       <a:srgbClr val="000000"/>
                     </a:solidFill>
@@ -11797,7 +11798,7 @@
               </a:ln>
               <a:extLst>
                 <a:ext uri="{91240B29-F687-4f45-9708-019B960494DF}">
-                  <a14:hiddenLine xmlns="" xmlns:a14="http://schemas.microsoft.com/office/drawing/2010/main" w="9525">
+                  <a14:hiddenLine xmlns:a14="http://schemas.microsoft.com/office/drawing/2010/main" xmlns="" w="9525">
                     <a:solidFill>
                       <a:srgbClr val="000000"/>
                     </a:solidFill>
@@ -12747,7 +12748,7 @@
         </p:nvSpPr>
         <p:spPr>
           <a:xfrm>
-            <a:off x="1141412" y="266826"/>
+            <a:off x="1141411" y="671272"/>
             <a:ext cx="9905998" cy="1078397"/>
           </a:xfrm>
         </p:spPr>
@@ -12780,14 +12781,20 @@
         </p:nvSpPr>
         <p:spPr>
           <a:xfrm>
-            <a:off x="1141412" y="1345223"/>
-            <a:ext cx="9905999" cy="5380892"/>
+            <a:off x="1141411" y="1846385"/>
+            <a:ext cx="9905999" cy="4703885"/>
           </a:xfrm>
         </p:spPr>
         <p:txBody>
-          <a:bodyPr/>
+          <a:bodyPr>
+            <a:normAutofit lnSpcReduction="10000"/>
+          </a:bodyPr>
           <a:lstStyle/>
           <a:p>
+            <a:pPr marL="514350" indent="-514350">
+              <a:buFont typeface="+mj-lt"/>
+              <a:buAutoNum type="romanUcPeriod"/>
+            </a:pPr>
             <a:r>
               <a:rPr lang="en-GB" dirty="0"/>
               <a:t>The first situation we encountered was the one in which the field and year of study of the student couldn't be found in the university's files. To treat this case, we used a flow decision activity in which we check with the help of a </a:t>
@@ -12802,13 +12809,55 @@
             </a:r>
           </a:p>
           <a:p>
+            <a:pPr marL="514350" indent="-514350">
+              <a:buFont typeface="+mj-lt"/>
+              <a:buAutoNum type="romanUcPeriod"/>
+            </a:pPr>
+            <a:endParaRPr lang="en-GB" dirty="0"/>
+          </a:p>
+          <a:p>
+            <a:pPr marL="514350" indent="-514350">
+              <a:buFont typeface="+mj-lt"/>
+              <a:buAutoNum type="romanUcPeriod"/>
+            </a:pPr>
             <a:r>
               <a:rPr lang="en-GB" dirty="0"/>
               <a:t>Another problem we found was that if the student was in a terminal year, then he would have some optional subjects and we couldn't know which subject he has chosen from the many available. Furthermore, the university's files do not provide any exam dates for those subjects. In solution, we decided to include a warning message in the email we sent to the user.</a:t>
             </a:r>
           </a:p>
           <a:p>
-            <a:endParaRPr lang="en-US" dirty="0"/>
+            <a:pPr marL="514350" indent="-514350">
+              <a:buFont typeface="+mj-lt"/>
+              <a:buAutoNum type="romanUcPeriod"/>
+            </a:pPr>
+            <a:endParaRPr lang="en-GB" dirty="0"/>
+          </a:p>
+          <a:p>
+            <a:pPr marL="514350" indent="-514350">
+              <a:buFont typeface="+mj-lt"/>
+              <a:buAutoNum type="romanUcPeriod"/>
+            </a:pPr>
+            <a:endParaRPr lang="en-GB" dirty="0"/>
+          </a:p>
+          <a:p>
+            <a:pPr marL="514350" indent="-514350">
+              <a:buFont typeface="+mj-lt"/>
+              <a:buAutoNum type="romanUcPeriod"/>
+            </a:pPr>
+            <a:endParaRPr lang="en-GB" dirty="0"/>
+          </a:p>
+          <a:p>
+            <a:pPr marL="514350" indent="-514350">
+              <a:buFont typeface="+mj-lt"/>
+              <a:buAutoNum type="romanUcPeriod"/>
+            </a:pPr>
+            <a:endParaRPr lang="en-GB" dirty="0"/>
+          </a:p>
+          <a:p>
+            <a:pPr marL="0" indent="0">
+              <a:buNone/>
+            </a:pPr>
+            <a:endParaRPr lang="en-GB" dirty="0"/>
           </a:p>
         </p:txBody>
       </p:sp>
@@ -12844,6 +12893,107 @@
       </p:grpSpPr>
       <p:sp>
         <p:nvSpPr>
+          <p:cNvPr id="3" name="Content Placeholder 2">
+            <a:extLst>
+              <a:ext uri="{FF2B5EF4-FFF2-40B4-BE49-F238E27FC236}">
+                <a16:creationId xmlns:a16="http://schemas.microsoft.com/office/drawing/2014/main" id="{A45E2773-7183-4201-ABE7-E20F21518482}"/>
+              </a:ext>
+            </a:extLst>
+          </p:cNvPr>
+          <p:cNvSpPr>
+            <a:spLocks noGrp="1"/>
+          </p:cNvSpPr>
+          <p:nvPr>
+            <p:ph idx="1"/>
+          </p:nvPr>
+        </p:nvSpPr>
+        <p:spPr>
+          <a:xfrm>
+            <a:off x="1143000" y="2497015"/>
+            <a:ext cx="9905999" cy="3610709"/>
+          </a:xfrm>
+        </p:spPr>
+        <p:txBody>
+          <a:bodyPr/>
+          <a:lstStyle/>
+          <a:p>
+            <a:pPr marL="514350" indent="-514350">
+              <a:buFont typeface="+mj-lt"/>
+              <a:buAutoNum type="romanUcPeriod" startAt="3"/>
+            </a:pPr>
+            <a:r>
+              <a:rPr lang="en-GB" dirty="0"/>
+              <a:t>The last special case we stepped upon was the one in which the student has, somehow, misspelled the number of his class and we could not find it in the university file. As a solution, we decided to show a message to let the user know the problem and, perhaps, fix it.</a:t>
+            </a:r>
+            <a:endParaRPr lang="en-US" dirty="0"/>
+          </a:p>
+        </p:txBody>
+      </p:sp>
+      <p:sp>
+        <p:nvSpPr>
+          <p:cNvPr id="4" name="Title 1">
+            <a:extLst>
+              <a:ext uri="{FF2B5EF4-FFF2-40B4-BE49-F238E27FC236}">
+                <a16:creationId xmlns:a16="http://schemas.microsoft.com/office/drawing/2014/main" id="{FFE136F0-F5C5-4522-A4FE-393097714136}"/>
+              </a:ext>
+            </a:extLst>
+          </p:cNvPr>
+          <p:cNvSpPr>
+            <a:spLocks noGrp="1"/>
+          </p:cNvSpPr>
+          <p:nvPr>
+            <p:ph type="title"/>
+          </p:nvPr>
+        </p:nvSpPr>
+        <p:spPr>
+          <a:xfrm>
+            <a:off x="1143001" y="935041"/>
+            <a:ext cx="9905998" cy="1078397"/>
+          </a:xfrm>
+        </p:spPr>
+        <p:txBody>
+          <a:bodyPr/>
+          <a:lstStyle/>
+          <a:p>
+            <a:r>
+              <a:rPr lang="en-US" dirty="0"/>
+              <a:t>Exceptional situations</a:t>
+            </a:r>
+          </a:p>
+        </p:txBody>
+      </p:sp>
+    </p:spTree>
+    <p:extLst>
+      <p:ext uri="{BB962C8B-B14F-4D97-AF65-F5344CB8AC3E}">
+        <p14:creationId xmlns:p14="http://schemas.microsoft.com/office/powerpoint/2010/main" val="2441421914"/>
+      </p:ext>
+    </p:extLst>
+  </p:cSld>
+  <p:clrMapOvr>
+    <a:masterClrMapping/>
+  </p:clrMapOvr>
+</p:sld>
+</file>
+
+<file path=ppt/slides/slide6.xml><?xml version="1.0" encoding="utf-8"?>
+<p:sld xmlns:a="http://schemas.openxmlformats.org/drawingml/2006/main" xmlns:r="http://schemas.openxmlformats.org/officeDocument/2006/relationships" xmlns:p="http://schemas.openxmlformats.org/presentationml/2006/main">
+  <p:cSld>
+    <p:spTree>
+      <p:nvGrpSpPr>
+        <p:cNvPr id="1" name=""/>
+        <p:cNvGrpSpPr/>
+        <p:nvPr/>
+      </p:nvGrpSpPr>
+      <p:grpSpPr>
+        <a:xfrm>
+          <a:off x="0" y="0"/>
+          <a:ext cx="0" cy="0"/>
+          <a:chOff x="0" y="0"/>
+          <a:chExt cx="0" cy="0"/>
+        </a:xfrm>
+      </p:grpSpPr>
+      <p:sp>
+        <p:nvSpPr>
           <p:cNvPr id="2" name="Title 1">
             <a:extLst>
               <a:ext uri="{FF2B5EF4-FFF2-40B4-BE49-F238E27FC236}">
@@ -12858,15 +13008,19 @@
             <p:ph type="title"/>
           </p:nvPr>
         </p:nvSpPr>
-        <p:spPr/>
+        <p:spPr>
+          <a:xfrm>
+            <a:off x="1141413" y="770917"/>
+            <a:ext cx="9905998" cy="1478570"/>
+          </a:xfrm>
+        </p:spPr>
         <p:txBody>
           <a:bodyPr/>
           <a:lstStyle/>
           <a:p>
-            <a:pPr algn="ctr"/>
             <a:r>
               <a:rPr lang="ro-RO" dirty="0"/>
-              <a:t>//challenges in the implemetation</a:t>
+              <a:t>challenges in the implemetation</a:t>
             </a:r>
             <a:endParaRPr lang="en-US" dirty="0"/>
           </a:p>
@@ -12893,7 +13047,29 @@
           <a:bodyPr/>
           <a:lstStyle/>
           <a:p>
-            <a:endParaRPr lang="en-US"/>
+            <a:pPr marL="0" indent="0">
+              <a:buNone/>
+            </a:pPr>
+            <a:r>
+              <a:rPr lang="en-GB" dirty="0"/>
+              <a:t>Our biggest challenge was to find out how to create a new event in the Google Calendar. We've done our research regarding the issue, but none of the sources and examples we found could clarify the process for us.</a:t>
+            </a:r>
+          </a:p>
+          <a:p>
+            <a:pPr marL="0" indent="0">
+              <a:buNone/>
+            </a:pPr>
+            <a:endParaRPr lang="en-GB" dirty="0"/>
+          </a:p>
+          <a:p>
+            <a:pPr marL="0" indent="0">
+              <a:buNone/>
+            </a:pPr>
+            <a:r>
+              <a:rPr lang="en-GB" dirty="0"/>
+              <a:t>Another challenge for us was to figure out how to read the .doc file and parse the text so it would be easier for us to work with it.</a:t>
+            </a:r>
+            <a:endParaRPr lang="en-US" dirty="0"/>
           </a:p>
         </p:txBody>
       </p:sp>
@@ -12910,7 +13086,7 @@
 </p:sld>
 </file>
 
-<file path=ppt/slides/slide6.xml><?xml version="1.0" encoding="utf-8"?>
+<file path=ppt/slides/slide7.xml><?xml version="1.0" encoding="utf-8"?>
 <p:sld xmlns:a="http://schemas.openxmlformats.org/drawingml/2006/main" xmlns:r="http://schemas.openxmlformats.org/officeDocument/2006/relationships" xmlns:p="http://schemas.openxmlformats.org/presentationml/2006/main">
   <p:cSld>
     <p:spTree>
@@ -12948,10 +13124,9 @@
           <a:bodyPr/>
           <a:lstStyle/>
           <a:p>
-            <a:pPr algn="ctr"/>
             <a:r>
               <a:rPr lang="ro-RO" dirty="0"/>
-              <a:t>//conclusions</a:t>
+              <a:t>conclusions</a:t>
             </a:r>
             <a:endParaRPr lang="en-US" dirty="0"/>
           </a:p>
@@ -12978,7 +13153,31 @@
           <a:bodyPr/>
           <a:lstStyle/>
           <a:p>
-            <a:endParaRPr lang="en-US"/>
+            <a:pPr marL="0" indent="0">
+              <a:buNone/>
+            </a:pPr>
+            <a:r>
+              <a:rPr lang="en-GB" dirty="0"/>
+              <a:t>We are proud of what we achieved, although your project isn't finished and our goal is not yet achieved. </a:t>
+            </a:r>
+          </a:p>
+          <a:p>
+            <a:pPr marL="0" indent="0">
+              <a:buNone/>
+            </a:pPr>
+            <a:r>
+              <a:rPr lang="en-GB" dirty="0"/>
+              <a:t>We enjoyed learning to use </a:t>
+            </a:r>
+            <a:r>
+              <a:rPr lang="en-GB" dirty="0" err="1"/>
+              <a:t>UiPath</a:t>
+            </a:r>
+            <a:r>
+              <a:rPr lang="en-GB" dirty="0"/>
+              <a:t>, because it is really different  to what we had experienced so was in the years of university.</a:t>
+            </a:r>
+            <a:endParaRPr lang="en-US" dirty="0"/>
           </a:p>
         </p:txBody>
       </p:sp>
@@ -12995,7 +13194,7 @@
 </p:sld>
 </file>
 
-<file path=ppt/slides/slide7.xml><?xml version="1.0" encoding="utf-8"?>
+<file path=ppt/slides/slide8.xml><?xml version="1.0" encoding="utf-8"?>
 <p:sld xmlns:a="http://schemas.openxmlformats.org/drawingml/2006/main" xmlns:r="http://schemas.openxmlformats.org/officeDocument/2006/relationships" xmlns:p="http://schemas.openxmlformats.org/presentationml/2006/main">
   <p:cSld>
     <p:spTree>

</xml_diff>